<commit_message>
Upload HW connection document
</commit_message>
<xml_diff>
--- a/Documents/Kernel_implement.pptx
+++ b/Documents/Kernel_implement.pptx
@@ -5,14 +5,15 @@
     <p:sldMasterId id="2147483660" r:id="rId1"/>
   </p:sldMasterIdLst>
   <p:notesMasterIdLst>
-    <p:notesMasterId r:id="rId4"/>
+    <p:notesMasterId r:id="rId5"/>
   </p:notesMasterIdLst>
   <p:sldIdLst>
     <p:sldId id="259" r:id="rId2"/>
     <p:sldId id="260" r:id="rId3"/>
+    <p:sldId id="262" r:id="rId4"/>
   </p:sldIdLst>
   <p:sldSz cx="12192000" cy="6858000"/>
-  <p:notesSz cx="6858000" cy="9144000"/>
+  <p:notesSz cx="6797675" cy="9926638"/>
   <p:defaultTextStyle>
     <a:defPPr>
       <a:defRPr lang="ko-KR"/>
@@ -154,7 +155,7 @@
         <p:spPr>
           <a:xfrm>
             <a:off x="0" y="0"/>
-            <a:ext cx="2971800" cy="458788"/>
+            <a:ext cx="2945659" cy="498056"/>
           </a:xfrm>
           <a:prstGeom prst="rect">
             <a:avLst/>
@@ -184,8 +185,8 @@
         </p:nvSpPr>
         <p:spPr>
           <a:xfrm>
-            <a:off x="3884613" y="0"/>
-            <a:ext cx="2971800" cy="458788"/>
+            <a:off x="3850443" y="0"/>
+            <a:ext cx="2945659" cy="498056"/>
           </a:xfrm>
           <a:prstGeom prst="rect">
             <a:avLst/>
@@ -201,7 +202,7 @@
           <a:p>
             <a:fld id="{EA1FF9E3-8C64-4DA4-AC28-B77B71C7DCC5}" type="datetimeFigureOut">
               <a:rPr lang="ko-KR" altLang="en-US" smtClean="0"/>
-              <a:t>2018-11-15</a:t>
+              <a:t>2018-12-06</a:t>
             </a:fld>
             <a:endParaRPr lang="ko-KR" altLang="en-US"/>
           </a:p>
@@ -219,8 +220,8 @@
         </p:nvSpPr>
         <p:spPr>
           <a:xfrm>
-            <a:off x="685800" y="1143000"/>
-            <a:ext cx="5486400" cy="3086100"/>
+            <a:off x="422275" y="1241425"/>
+            <a:ext cx="5953125" cy="3349625"/>
           </a:xfrm>
           <a:prstGeom prst="rect">
             <a:avLst/>
@@ -252,8 +253,8 @@
         </p:nvSpPr>
         <p:spPr>
           <a:xfrm>
-            <a:off x="685800" y="4400550"/>
-            <a:ext cx="5486400" cy="3600450"/>
+            <a:off x="679768" y="4777194"/>
+            <a:ext cx="5438140" cy="3908614"/>
           </a:xfrm>
           <a:prstGeom prst="rect">
             <a:avLst/>
@@ -311,8 +312,8 @@
         </p:nvSpPr>
         <p:spPr>
           <a:xfrm>
-            <a:off x="0" y="8685213"/>
-            <a:ext cx="2971800" cy="458787"/>
+            <a:off x="0" y="9428584"/>
+            <a:ext cx="2945659" cy="498055"/>
           </a:xfrm>
           <a:prstGeom prst="rect">
             <a:avLst/>
@@ -342,8 +343,8 @@
         </p:nvSpPr>
         <p:spPr>
           <a:xfrm>
-            <a:off x="3884613" y="8685213"/>
-            <a:ext cx="2971800" cy="458787"/>
+            <a:off x="3850443" y="9428584"/>
+            <a:ext cx="2945659" cy="498055"/>
           </a:xfrm>
           <a:prstGeom prst="rect">
             <a:avLst/>
@@ -732,7 +733,7 @@
             <a:fld id="{A4E24021-43AB-4E93-998D-699CE5E58B5C}" type="datetime4">
               <a:rPr lang="ko-KR" altLang="en-US" smtClean="0"/>
               <a:pPr/>
-              <a:t>2018년 11월 15일</a:t>
+              <a:t>2018년 12월 6일</a:t>
             </a:fld>
             <a:endParaRPr lang="en-US" dirty="0"/>
           </a:p>
@@ -1017,7 +1018,7 @@
             <a:fld id="{B3D5B25B-EC36-4BC0-84ED-D01E4AD690B3}" type="datetime4">
               <a:rPr lang="ko-KR" altLang="en-US" smtClean="0"/>
               <a:pPr/>
-              <a:t>2018년 11월 15일</a:t>
+              <a:t>2018년 12월 6일</a:t>
             </a:fld>
             <a:endParaRPr lang="en-US" dirty="0"/>
           </a:p>
@@ -1276,7 +1277,7 @@
             <a:fld id="{98EE465E-3D0C-432A-9E67-582EEBBC8739}" type="datetime4">
               <a:rPr lang="ko-KR" altLang="en-US" smtClean="0"/>
               <a:pPr/>
-              <a:t>2018년 11월 15일</a:t>
+              <a:t>2018년 12월 6일</a:t>
             </a:fld>
             <a:endParaRPr lang="en-US" dirty="0"/>
           </a:p>
@@ -1718,7 +1719,7 @@
             <a:fld id="{8845D1C0-D6DE-4F8D-8724-C16FFD36AC09}" type="datetime4">
               <a:rPr lang="ko-KR" altLang="en-US" smtClean="0"/>
               <a:pPr/>
-              <a:t>2018년 11월 15일</a:t>
+              <a:t>2018년 12월 6일</a:t>
             </a:fld>
             <a:endParaRPr lang="en-US" dirty="0"/>
           </a:p>
@@ -2268,7 +2269,7 @@
             <a:fld id="{7F694308-BEB5-43C2-96B3-777BAF31FA92}" type="datetime4">
               <a:rPr lang="ko-KR" altLang="en-US" smtClean="0"/>
               <a:pPr/>
-              <a:t>2018년 11월 15일</a:t>
+              <a:t>2018년 12월 6일</a:t>
             </a:fld>
             <a:endParaRPr lang="en-US" dirty="0"/>
           </a:p>
@@ -2462,7 +2463,7 @@
             <a:fld id="{E92518E5-899D-4F1C-B9C0-4153F589D8C4}" type="datetime4">
               <a:rPr lang="ko-KR" altLang="en-US" smtClean="0"/>
               <a:pPr/>
-              <a:t>2018년 11월 15일</a:t>
+              <a:t>2018년 12월 6일</a:t>
             </a:fld>
             <a:endParaRPr lang="en-US" dirty="0"/>
           </a:p>
@@ -2626,7 +2627,7 @@
             <a:fld id="{A9AB2EC4-AC50-4AAA-838D-1B8620D65867}" type="datetime4">
               <a:rPr lang="ko-KR" altLang="en-US" smtClean="0"/>
               <a:pPr/>
-              <a:t>2018년 11월 15일</a:t>
+              <a:t>2018년 12월 6일</a:t>
             </a:fld>
             <a:endParaRPr lang="en-US" dirty="0"/>
           </a:p>
@@ -3015,7 +3016,7 @@
             <a:fld id="{CBCA9A85-B5CB-4659-B7AD-2ADB675ACA4D}" type="datetime4">
               <a:rPr lang="ko-KR" altLang="en-US" smtClean="0"/>
               <a:pPr/>
-              <a:t>2018년 11월 15일</a:t>
+              <a:t>2018년 12월 6일</a:t>
             </a:fld>
             <a:endParaRPr lang="en-US" dirty="0"/>
           </a:p>
@@ -3494,7 +3495,7 @@
             <a:fld id="{E77BDE08-EF69-4CDE-9817-908A40DB987B}" type="datetime4">
               <a:rPr lang="ko-KR" altLang="en-US" smtClean="0"/>
               <a:pPr/>
-              <a:t>2018년 11월 15일</a:t>
+              <a:t>2018년 12월 6일</a:t>
             </a:fld>
             <a:endParaRPr lang="en-US" dirty="0"/>
           </a:p>
@@ -3762,7 +3763,7 @@
             <a:fld id="{2A2311A3-2538-42DE-AEC3-5B7A40B68862}" type="datetime4">
               <a:rPr lang="ko-KR" altLang="en-US" smtClean="0"/>
               <a:pPr/>
-              <a:t>2018년 11월 15일</a:t>
+              <a:t>2018년 12월 6일</a:t>
             </a:fld>
             <a:endParaRPr lang="en-US" dirty="0"/>
           </a:p>
@@ -4970,6 +4971,1739 @@
     <p:extLst>
       <p:ext uri="{BB962C8B-B14F-4D97-AF65-F5344CB8AC3E}">
         <p14:creationId xmlns:p14="http://schemas.microsoft.com/office/powerpoint/2010/main" val="1687434340"/>
+      </p:ext>
+    </p:extLst>
+  </p:cSld>
+  <p:clrMapOvr>
+    <a:masterClrMapping/>
+  </p:clrMapOvr>
+  <mc:AlternateContent xmlns:mc="http://schemas.openxmlformats.org/markup-compatibility/2006" xmlns:p14="http://schemas.microsoft.com/office/powerpoint/2010/main">
+    <mc:Choice Requires="p14">
+      <p:transition spd="med" p14:dur="700">
+        <p:fade/>
+      </p:transition>
+    </mc:Choice>
+    <mc:Fallback xmlns="">
+      <p:transition spd="med">
+        <p:fade/>
+      </p:transition>
+    </mc:Fallback>
+  </mc:AlternateContent>
+</p:sld>
+</file>
+
+<file path=ppt/slides/slide3.xml><?xml version="1.0" encoding="utf-8"?>
+<p:sld xmlns:a="http://schemas.openxmlformats.org/drawingml/2006/main" xmlns:r="http://schemas.openxmlformats.org/officeDocument/2006/relationships" xmlns:p="http://schemas.openxmlformats.org/presentationml/2006/main">
+  <p:cSld>
+    <p:spTree>
+      <p:nvGrpSpPr>
+        <p:cNvPr id="1" name=""/>
+        <p:cNvGrpSpPr/>
+        <p:nvPr/>
+      </p:nvGrpSpPr>
+      <p:grpSpPr>
+        <a:xfrm>
+          <a:off x="0" y="0"/>
+          <a:ext cx="0" cy="0"/>
+          <a:chOff x="0" y="0"/>
+          <a:chExt cx="0" cy="0"/>
+        </a:xfrm>
+      </p:grpSpPr>
+      <p:sp>
+        <p:nvSpPr>
+          <p:cNvPr id="2" name="제목 1">
+            <a:extLst>
+              <a:ext uri="{FF2B5EF4-FFF2-40B4-BE49-F238E27FC236}">
+                <a16:creationId xmlns:a16="http://schemas.microsoft.com/office/drawing/2014/main" id="{4C8C7604-8EFE-4923-BF37-B3672FC78F99}"/>
+              </a:ext>
+            </a:extLst>
+          </p:cNvPr>
+          <p:cNvSpPr>
+            <a:spLocks noGrp="1"/>
+          </p:cNvSpPr>
+          <p:nvPr>
+            <p:ph type="title"/>
+          </p:nvPr>
+        </p:nvSpPr>
+        <p:spPr/>
+        <p:txBody>
+          <a:bodyPr/>
+          <a:lstStyle/>
+          <a:p>
+            <a:r>
+              <a:rPr lang="en-US" altLang="ko-KR" dirty="0" err="1">
+                <a:solidFill>
+                  <a:schemeClr val="tx1"/>
+                </a:solidFill>
+              </a:rPr>
+              <a:t>rpi</a:t>
+            </a:r>
+            <a:r>
+              <a:rPr lang="en-US" altLang="ko-KR" dirty="0">
+                <a:solidFill>
+                  <a:schemeClr val="tx1"/>
+                </a:solidFill>
+              </a:rPr>
+              <a:t>-</a:t>
+            </a:r>
+            <a:r>
+              <a:rPr lang="en-US" altLang="ko-KR" dirty="0" err="1">
+                <a:solidFill>
+                  <a:schemeClr val="tx1"/>
+                </a:solidFill>
+              </a:rPr>
+              <a:t>rgb</a:t>
+            </a:r>
+            <a:r>
+              <a:rPr lang="en-US" altLang="ko-KR" dirty="0">
+                <a:solidFill>
+                  <a:schemeClr val="tx1"/>
+                </a:solidFill>
+              </a:rPr>
+              <a:t>-led-matrix Lib</a:t>
+            </a:r>
+            <a:r>
+              <a:rPr lang="ko-KR" altLang="en-US" dirty="0">
+                <a:solidFill>
+                  <a:schemeClr val="tx1"/>
+                </a:solidFill>
+              </a:rPr>
+              <a:t> 사용</a:t>
+            </a:r>
+          </a:p>
+        </p:txBody>
+      </p:sp>
+      <p:pic>
+        <p:nvPicPr>
+          <p:cNvPr id="1026" name="Picture 2" descr="Hub 75 interface">
+            <a:extLst>
+              <a:ext uri="{FF2B5EF4-FFF2-40B4-BE49-F238E27FC236}">
+                <a16:creationId xmlns:a16="http://schemas.microsoft.com/office/drawing/2014/main" id="{FE74D9A6-0401-4BAD-85AD-211E1002C987}"/>
+              </a:ext>
+            </a:extLst>
+          </p:cNvPr>
+          <p:cNvPicPr>
+            <a:picLocks noChangeAspect="1" noChangeArrowheads="1"/>
+          </p:cNvPicPr>
+          <p:nvPr/>
+        </p:nvPicPr>
+        <p:blipFill>
+          <a:blip r:embed="rId2">
+            <a:extLst>
+              <a:ext uri="{28A0092B-C50C-407E-A947-70E740481C1C}">
+                <a14:useLocalDpi xmlns:a14="http://schemas.microsoft.com/office/drawing/2010/main" val="0"/>
+              </a:ext>
+            </a:extLst>
+          </a:blip>
+          <a:srcRect/>
+          <a:stretch>
+            <a:fillRect/>
+          </a:stretch>
+        </p:blipFill>
+        <p:spPr bwMode="auto">
+          <a:xfrm>
+            <a:off x="9823745" y="1789281"/>
+            <a:ext cx="1466850" cy="2857500"/>
+          </a:xfrm>
+          <a:prstGeom prst="rect">
+            <a:avLst/>
+          </a:prstGeom>
+          <a:noFill/>
+          <a:extLst>
+            <a:ext uri="{909E8E84-426E-40DD-AFC4-6F175D3DCCD1}">
+              <a14:hiddenFill xmlns:a14="http://schemas.microsoft.com/office/drawing/2010/main">
+                <a:solidFill>
+                  <a:srgbClr val="FFFFFF"/>
+                </a:solidFill>
+              </a14:hiddenFill>
+            </a:ext>
+          </a:extLst>
+        </p:spPr>
+      </p:pic>
+      <p:pic>
+        <p:nvPicPr>
+          <p:cNvPr id="5" name="Picture 2" descr="Image result for ë¼ì¦ë² ë¦¬íì´3 íë§µ">
+            <a:extLst>
+              <a:ext uri="{FF2B5EF4-FFF2-40B4-BE49-F238E27FC236}">
+                <a16:creationId xmlns:a16="http://schemas.microsoft.com/office/drawing/2014/main" id="{4CA09632-C68F-4F9F-AA15-5CE63E64AAA2}"/>
+              </a:ext>
+            </a:extLst>
+          </p:cNvPr>
+          <p:cNvPicPr>
+            <a:picLocks noChangeAspect="1" noChangeArrowheads="1"/>
+          </p:cNvPicPr>
+          <p:nvPr/>
+        </p:nvPicPr>
+        <p:blipFill>
+          <a:blip r:embed="rId3">
+            <a:extLst>
+              <a:ext uri="{28A0092B-C50C-407E-A947-70E740481C1C}">
+                <a14:useLocalDpi xmlns:a14="http://schemas.microsoft.com/office/drawing/2010/main" val="0"/>
+              </a:ext>
+            </a:extLst>
+          </a:blip>
+          <a:srcRect/>
+          <a:stretch>
+            <a:fillRect/>
+          </a:stretch>
+        </p:blipFill>
+        <p:spPr bwMode="auto">
+          <a:xfrm>
+            <a:off x="4115396" y="993106"/>
+            <a:ext cx="4727130" cy="4930276"/>
+          </a:xfrm>
+          <a:prstGeom prst="rect">
+            <a:avLst/>
+          </a:prstGeom>
+          <a:noFill/>
+          <a:extLst>
+            <a:ext uri="{909E8E84-426E-40DD-AFC4-6F175D3DCCD1}">
+              <a14:hiddenFill xmlns:a14="http://schemas.microsoft.com/office/drawing/2010/main">
+                <a:solidFill>
+                  <a:srgbClr val="FFFFFF"/>
+                </a:solidFill>
+              </a14:hiddenFill>
+            </a:ext>
+          </a:extLst>
+        </p:spPr>
+      </p:pic>
+      <p:sp>
+        <p:nvSpPr>
+          <p:cNvPr id="7" name="직사각형 6">
+            <a:extLst>
+              <a:ext uri="{FF2B5EF4-FFF2-40B4-BE49-F238E27FC236}">
+                <a16:creationId xmlns:a16="http://schemas.microsoft.com/office/drawing/2014/main" id="{B5241CD9-5942-4DE0-87FF-3C9188CD0922}"/>
+              </a:ext>
+            </a:extLst>
+          </p:cNvPr>
+          <p:cNvSpPr/>
+          <p:nvPr/>
+        </p:nvSpPr>
+        <p:spPr>
+          <a:xfrm>
+            <a:off x="6306137" y="1576592"/>
+            <a:ext cx="141982" cy="162025"/>
+          </a:xfrm>
+          <a:prstGeom prst="rect">
+            <a:avLst/>
+          </a:prstGeom>
+          <a:ln>
+            <a:noFill/>
+          </a:ln>
+        </p:spPr>
+        <p:style>
+          <a:lnRef idx="1">
+            <a:schemeClr val="accent2"/>
+          </a:lnRef>
+          <a:fillRef idx="2">
+            <a:schemeClr val="accent2"/>
+          </a:fillRef>
+          <a:effectRef idx="1">
+            <a:schemeClr val="accent2"/>
+          </a:effectRef>
+          <a:fontRef idx="minor">
+            <a:schemeClr val="dk1"/>
+          </a:fontRef>
+        </p:style>
+        <p:txBody>
+          <a:bodyPr rtlCol="0" anchor="ctr"/>
+          <a:lstStyle/>
+          <a:p>
+            <a:pPr algn="ctr"/>
+            <a:endParaRPr lang="ko-KR" altLang="en-US" dirty="0"/>
+          </a:p>
+        </p:txBody>
+      </p:sp>
+      <p:sp>
+        <p:nvSpPr>
+          <p:cNvPr id="10" name="직사각형 9">
+            <a:extLst>
+              <a:ext uri="{FF2B5EF4-FFF2-40B4-BE49-F238E27FC236}">
+                <a16:creationId xmlns:a16="http://schemas.microsoft.com/office/drawing/2014/main" id="{A7BDBFBB-21D5-40D6-9B05-6DDB0B5A7526}"/>
+              </a:ext>
+            </a:extLst>
+          </p:cNvPr>
+          <p:cNvSpPr/>
+          <p:nvPr/>
+        </p:nvSpPr>
+        <p:spPr>
+          <a:xfrm>
+            <a:off x="6503575" y="1576592"/>
+            <a:ext cx="156181" cy="162025"/>
+          </a:xfrm>
+          <a:prstGeom prst="rect">
+            <a:avLst/>
+          </a:prstGeom>
+          <a:ln>
+            <a:noFill/>
+          </a:ln>
+        </p:spPr>
+        <p:style>
+          <a:lnRef idx="1">
+            <a:schemeClr val="accent2"/>
+          </a:lnRef>
+          <a:fillRef idx="2">
+            <a:schemeClr val="accent2"/>
+          </a:fillRef>
+          <a:effectRef idx="1">
+            <a:schemeClr val="accent2"/>
+          </a:effectRef>
+          <a:fontRef idx="minor">
+            <a:schemeClr val="dk1"/>
+          </a:fontRef>
+        </p:style>
+        <p:txBody>
+          <a:bodyPr rtlCol="0" anchor="ctr"/>
+          <a:lstStyle/>
+          <a:p>
+            <a:pPr algn="ctr"/>
+            <a:endParaRPr lang="ko-KR" altLang="en-US" dirty="0"/>
+          </a:p>
+        </p:txBody>
+      </p:sp>
+      <p:sp>
+        <p:nvSpPr>
+          <p:cNvPr id="11" name="직사각형 10">
+            <a:extLst>
+              <a:ext uri="{FF2B5EF4-FFF2-40B4-BE49-F238E27FC236}">
+                <a16:creationId xmlns:a16="http://schemas.microsoft.com/office/drawing/2014/main" id="{C0F27BC2-A518-4672-99B8-ECF45F1F3B72}"/>
+              </a:ext>
+            </a:extLst>
+          </p:cNvPr>
+          <p:cNvSpPr/>
+          <p:nvPr/>
+        </p:nvSpPr>
+        <p:spPr>
+          <a:xfrm>
+            <a:off x="6307709" y="1794981"/>
+            <a:ext cx="141982" cy="162025"/>
+          </a:xfrm>
+          <a:prstGeom prst="rect">
+            <a:avLst/>
+          </a:prstGeom>
+          <a:ln>
+            <a:noFill/>
+          </a:ln>
+        </p:spPr>
+        <p:style>
+          <a:lnRef idx="1">
+            <a:schemeClr val="accent2"/>
+          </a:lnRef>
+          <a:fillRef idx="2">
+            <a:schemeClr val="accent2"/>
+          </a:fillRef>
+          <a:effectRef idx="1">
+            <a:schemeClr val="accent2"/>
+          </a:effectRef>
+          <a:fontRef idx="minor">
+            <a:schemeClr val="dk1"/>
+          </a:fontRef>
+        </p:style>
+        <p:txBody>
+          <a:bodyPr rtlCol="0" anchor="ctr"/>
+          <a:lstStyle/>
+          <a:p>
+            <a:pPr algn="ctr"/>
+            <a:endParaRPr lang="ko-KR" altLang="en-US" dirty="0"/>
+          </a:p>
+        </p:txBody>
+      </p:sp>
+      <p:sp>
+        <p:nvSpPr>
+          <p:cNvPr id="13" name="직사각형 12">
+            <a:extLst>
+              <a:ext uri="{FF2B5EF4-FFF2-40B4-BE49-F238E27FC236}">
+                <a16:creationId xmlns:a16="http://schemas.microsoft.com/office/drawing/2014/main" id="{CA16CE34-1E15-45E1-B6FC-3379357E9C0B}"/>
+              </a:ext>
+            </a:extLst>
+          </p:cNvPr>
+          <p:cNvSpPr/>
+          <p:nvPr/>
+        </p:nvSpPr>
+        <p:spPr>
+          <a:xfrm>
+            <a:off x="6505147" y="1794981"/>
+            <a:ext cx="156181" cy="162025"/>
+          </a:xfrm>
+          <a:prstGeom prst="rect">
+            <a:avLst/>
+          </a:prstGeom>
+          <a:ln>
+            <a:noFill/>
+          </a:ln>
+        </p:spPr>
+        <p:style>
+          <a:lnRef idx="1">
+            <a:schemeClr val="accent2"/>
+          </a:lnRef>
+          <a:fillRef idx="2">
+            <a:schemeClr val="accent2"/>
+          </a:fillRef>
+          <a:effectRef idx="1">
+            <a:schemeClr val="accent2"/>
+          </a:effectRef>
+          <a:fontRef idx="minor">
+            <a:schemeClr val="dk1"/>
+          </a:fontRef>
+        </p:style>
+        <p:txBody>
+          <a:bodyPr rtlCol="0" anchor="ctr"/>
+          <a:lstStyle/>
+          <a:p>
+            <a:pPr algn="ctr"/>
+            <a:endParaRPr lang="ko-KR" altLang="en-US" dirty="0"/>
+          </a:p>
+        </p:txBody>
+      </p:sp>
+      <p:sp>
+        <p:nvSpPr>
+          <p:cNvPr id="14" name="직사각형 13">
+            <a:extLst>
+              <a:ext uri="{FF2B5EF4-FFF2-40B4-BE49-F238E27FC236}">
+                <a16:creationId xmlns:a16="http://schemas.microsoft.com/office/drawing/2014/main" id="{48464F70-1B37-4F1E-B73F-D7EE4FE808CE}"/>
+              </a:ext>
+            </a:extLst>
+          </p:cNvPr>
+          <p:cNvSpPr/>
+          <p:nvPr/>
+        </p:nvSpPr>
+        <p:spPr>
+          <a:xfrm>
+            <a:off x="6307705" y="1992945"/>
+            <a:ext cx="141982" cy="162025"/>
+          </a:xfrm>
+          <a:prstGeom prst="rect">
+            <a:avLst/>
+          </a:prstGeom>
+          <a:ln>
+            <a:noFill/>
+          </a:ln>
+        </p:spPr>
+        <p:style>
+          <a:lnRef idx="1">
+            <a:schemeClr val="accent2"/>
+          </a:lnRef>
+          <a:fillRef idx="2">
+            <a:schemeClr val="accent2"/>
+          </a:fillRef>
+          <a:effectRef idx="1">
+            <a:schemeClr val="accent2"/>
+          </a:effectRef>
+          <a:fontRef idx="minor">
+            <a:schemeClr val="dk1"/>
+          </a:fontRef>
+        </p:style>
+        <p:txBody>
+          <a:bodyPr rtlCol="0" anchor="ctr"/>
+          <a:lstStyle/>
+          <a:p>
+            <a:pPr algn="ctr"/>
+            <a:endParaRPr lang="ko-KR" altLang="en-US" dirty="0"/>
+          </a:p>
+        </p:txBody>
+      </p:sp>
+      <p:sp>
+        <p:nvSpPr>
+          <p:cNvPr id="15" name="직사각형 14">
+            <a:extLst>
+              <a:ext uri="{FF2B5EF4-FFF2-40B4-BE49-F238E27FC236}">
+                <a16:creationId xmlns:a16="http://schemas.microsoft.com/office/drawing/2014/main" id="{CE240065-2A07-46D5-952B-7B6647F0053E}"/>
+              </a:ext>
+            </a:extLst>
+          </p:cNvPr>
+          <p:cNvSpPr/>
+          <p:nvPr/>
+        </p:nvSpPr>
+        <p:spPr>
+          <a:xfrm>
+            <a:off x="6505143" y="1992945"/>
+            <a:ext cx="156181" cy="162025"/>
+          </a:xfrm>
+          <a:prstGeom prst="rect">
+            <a:avLst/>
+          </a:prstGeom>
+          <a:ln>
+            <a:noFill/>
+          </a:ln>
+        </p:spPr>
+        <p:style>
+          <a:lnRef idx="1">
+            <a:schemeClr val="accent2"/>
+          </a:lnRef>
+          <a:fillRef idx="2">
+            <a:schemeClr val="accent2"/>
+          </a:fillRef>
+          <a:effectRef idx="1">
+            <a:schemeClr val="accent2"/>
+          </a:effectRef>
+          <a:fontRef idx="minor">
+            <a:schemeClr val="dk1"/>
+          </a:fontRef>
+        </p:style>
+        <p:txBody>
+          <a:bodyPr rtlCol="0" anchor="ctr"/>
+          <a:lstStyle/>
+          <a:p>
+            <a:pPr algn="ctr"/>
+            <a:endParaRPr lang="ko-KR" altLang="en-US" dirty="0"/>
+          </a:p>
+        </p:txBody>
+      </p:sp>
+      <p:sp>
+        <p:nvSpPr>
+          <p:cNvPr id="16" name="직사각형 15">
+            <a:extLst>
+              <a:ext uri="{FF2B5EF4-FFF2-40B4-BE49-F238E27FC236}">
+                <a16:creationId xmlns:a16="http://schemas.microsoft.com/office/drawing/2014/main" id="{EDF5F237-004B-4AB9-8DF8-22EEE0360BBB}"/>
+              </a:ext>
+            </a:extLst>
+          </p:cNvPr>
+          <p:cNvSpPr/>
+          <p:nvPr/>
+        </p:nvSpPr>
+        <p:spPr>
+          <a:xfrm>
+            <a:off x="6309277" y="2211334"/>
+            <a:ext cx="141982" cy="162025"/>
+          </a:xfrm>
+          <a:prstGeom prst="rect">
+            <a:avLst/>
+          </a:prstGeom>
+          <a:ln>
+            <a:noFill/>
+          </a:ln>
+        </p:spPr>
+        <p:style>
+          <a:lnRef idx="1">
+            <a:schemeClr val="accent2"/>
+          </a:lnRef>
+          <a:fillRef idx="2">
+            <a:schemeClr val="accent2"/>
+          </a:fillRef>
+          <a:effectRef idx="1">
+            <a:schemeClr val="accent2"/>
+          </a:effectRef>
+          <a:fontRef idx="minor">
+            <a:schemeClr val="dk1"/>
+          </a:fontRef>
+        </p:style>
+        <p:txBody>
+          <a:bodyPr rtlCol="0" anchor="ctr"/>
+          <a:lstStyle/>
+          <a:p>
+            <a:pPr algn="ctr"/>
+            <a:endParaRPr lang="ko-KR" altLang="en-US" dirty="0"/>
+          </a:p>
+        </p:txBody>
+      </p:sp>
+      <p:sp>
+        <p:nvSpPr>
+          <p:cNvPr id="17" name="직사각형 16">
+            <a:extLst>
+              <a:ext uri="{FF2B5EF4-FFF2-40B4-BE49-F238E27FC236}">
+                <a16:creationId xmlns:a16="http://schemas.microsoft.com/office/drawing/2014/main" id="{36F246E1-3018-4F14-9075-D4EFB0816199}"/>
+              </a:ext>
+            </a:extLst>
+          </p:cNvPr>
+          <p:cNvSpPr/>
+          <p:nvPr/>
+        </p:nvSpPr>
+        <p:spPr>
+          <a:xfrm>
+            <a:off x="6506715" y="2211334"/>
+            <a:ext cx="156181" cy="162025"/>
+          </a:xfrm>
+          <a:prstGeom prst="rect">
+            <a:avLst/>
+          </a:prstGeom>
+          <a:ln>
+            <a:noFill/>
+          </a:ln>
+        </p:spPr>
+        <p:style>
+          <a:lnRef idx="1">
+            <a:schemeClr val="accent2"/>
+          </a:lnRef>
+          <a:fillRef idx="2">
+            <a:schemeClr val="accent2"/>
+          </a:fillRef>
+          <a:effectRef idx="1">
+            <a:schemeClr val="accent2"/>
+          </a:effectRef>
+          <a:fontRef idx="minor">
+            <a:schemeClr val="dk1"/>
+          </a:fontRef>
+        </p:style>
+        <p:txBody>
+          <a:bodyPr rtlCol="0" anchor="ctr"/>
+          <a:lstStyle/>
+          <a:p>
+            <a:pPr algn="ctr"/>
+            <a:endParaRPr lang="ko-KR" altLang="en-US" dirty="0"/>
+          </a:p>
+        </p:txBody>
+      </p:sp>
+      <p:sp>
+        <p:nvSpPr>
+          <p:cNvPr id="18" name="직사각형 17">
+            <a:extLst>
+              <a:ext uri="{FF2B5EF4-FFF2-40B4-BE49-F238E27FC236}">
+                <a16:creationId xmlns:a16="http://schemas.microsoft.com/office/drawing/2014/main" id="{99BEB9DD-93DC-4759-96BF-A4A2DA381A2D}"/>
+              </a:ext>
+            </a:extLst>
+          </p:cNvPr>
+          <p:cNvSpPr/>
+          <p:nvPr/>
+        </p:nvSpPr>
+        <p:spPr>
+          <a:xfrm>
+            <a:off x="6307705" y="2417144"/>
+            <a:ext cx="141982" cy="162025"/>
+          </a:xfrm>
+          <a:prstGeom prst="rect">
+            <a:avLst/>
+          </a:prstGeom>
+          <a:ln>
+            <a:noFill/>
+          </a:ln>
+        </p:spPr>
+        <p:style>
+          <a:lnRef idx="1">
+            <a:schemeClr val="accent2"/>
+          </a:lnRef>
+          <a:fillRef idx="2">
+            <a:schemeClr val="accent2"/>
+          </a:fillRef>
+          <a:effectRef idx="1">
+            <a:schemeClr val="accent2"/>
+          </a:effectRef>
+          <a:fontRef idx="minor">
+            <a:schemeClr val="dk1"/>
+          </a:fontRef>
+        </p:style>
+        <p:txBody>
+          <a:bodyPr rtlCol="0" anchor="ctr"/>
+          <a:lstStyle/>
+          <a:p>
+            <a:pPr algn="ctr"/>
+            <a:endParaRPr lang="ko-KR" altLang="en-US" dirty="0"/>
+          </a:p>
+        </p:txBody>
+      </p:sp>
+      <p:sp>
+        <p:nvSpPr>
+          <p:cNvPr id="19" name="직사각형 18">
+            <a:extLst>
+              <a:ext uri="{FF2B5EF4-FFF2-40B4-BE49-F238E27FC236}">
+                <a16:creationId xmlns:a16="http://schemas.microsoft.com/office/drawing/2014/main" id="{B734392F-3A05-4B98-9717-6579554D0AD8}"/>
+              </a:ext>
+            </a:extLst>
+          </p:cNvPr>
+          <p:cNvSpPr/>
+          <p:nvPr/>
+        </p:nvSpPr>
+        <p:spPr>
+          <a:xfrm>
+            <a:off x="6505143" y="2417144"/>
+            <a:ext cx="156181" cy="162025"/>
+          </a:xfrm>
+          <a:prstGeom prst="rect">
+            <a:avLst/>
+          </a:prstGeom>
+          <a:ln>
+            <a:noFill/>
+          </a:ln>
+        </p:spPr>
+        <p:style>
+          <a:lnRef idx="1">
+            <a:schemeClr val="accent2"/>
+          </a:lnRef>
+          <a:fillRef idx="2">
+            <a:schemeClr val="accent2"/>
+          </a:fillRef>
+          <a:effectRef idx="1">
+            <a:schemeClr val="accent2"/>
+          </a:effectRef>
+          <a:fontRef idx="minor">
+            <a:schemeClr val="dk1"/>
+          </a:fontRef>
+        </p:style>
+        <p:txBody>
+          <a:bodyPr rtlCol="0" anchor="ctr"/>
+          <a:lstStyle/>
+          <a:p>
+            <a:pPr algn="ctr"/>
+            <a:endParaRPr lang="ko-KR" altLang="en-US" dirty="0"/>
+          </a:p>
+        </p:txBody>
+      </p:sp>
+      <p:sp>
+        <p:nvSpPr>
+          <p:cNvPr id="20" name="직사각형 19">
+            <a:extLst>
+              <a:ext uri="{FF2B5EF4-FFF2-40B4-BE49-F238E27FC236}">
+                <a16:creationId xmlns:a16="http://schemas.microsoft.com/office/drawing/2014/main" id="{ECF5A933-F0D2-4550-89C9-5EFB8234529D}"/>
+              </a:ext>
+            </a:extLst>
+          </p:cNvPr>
+          <p:cNvSpPr/>
+          <p:nvPr/>
+        </p:nvSpPr>
+        <p:spPr>
+          <a:xfrm>
+            <a:off x="6309277" y="2635533"/>
+            <a:ext cx="141982" cy="162025"/>
+          </a:xfrm>
+          <a:prstGeom prst="rect">
+            <a:avLst/>
+          </a:prstGeom>
+          <a:ln>
+            <a:noFill/>
+          </a:ln>
+        </p:spPr>
+        <p:style>
+          <a:lnRef idx="1">
+            <a:schemeClr val="accent2"/>
+          </a:lnRef>
+          <a:fillRef idx="2">
+            <a:schemeClr val="accent2"/>
+          </a:fillRef>
+          <a:effectRef idx="1">
+            <a:schemeClr val="accent2"/>
+          </a:effectRef>
+          <a:fontRef idx="minor">
+            <a:schemeClr val="dk1"/>
+          </a:fontRef>
+        </p:style>
+        <p:txBody>
+          <a:bodyPr rtlCol="0" anchor="ctr"/>
+          <a:lstStyle/>
+          <a:p>
+            <a:pPr algn="ctr"/>
+            <a:endParaRPr lang="ko-KR" altLang="en-US" dirty="0"/>
+          </a:p>
+        </p:txBody>
+      </p:sp>
+      <p:sp>
+        <p:nvSpPr>
+          <p:cNvPr id="21" name="직사각형 20">
+            <a:extLst>
+              <a:ext uri="{FF2B5EF4-FFF2-40B4-BE49-F238E27FC236}">
+                <a16:creationId xmlns:a16="http://schemas.microsoft.com/office/drawing/2014/main" id="{2F1566D5-57AF-4910-95F9-16A102AB0940}"/>
+              </a:ext>
+            </a:extLst>
+          </p:cNvPr>
+          <p:cNvSpPr/>
+          <p:nvPr/>
+        </p:nvSpPr>
+        <p:spPr>
+          <a:xfrm>
+            <a:off x="6506715" y="2635533"/>
+            <a:ext cx="156181" cy="162025"/>
+          </a:xfrm>
+          <a:prstGeom prst="rect">
+            <a:avLst/>
+          </a:prstGeom>
+          <a:ln>
+            <a:noFill/>
+          </a:ln>
+        </p:spPr>
+        <p:style>
+          <a:lnRef idx="1">
+            <a:schemeClr val="accent2"/>
+          </a:lnRef>
+          <a:fillRef idx="2">
+            <a:schemeClr val="accent2"/>
+          </a:fillRef>
+          <a:effectRef idx="1">
+            <a:schemeClr val="accent2"/>
+          </a:effectRef>
+          <a:fontRef idx="minor">
+            <a:schemeClr val="dk1"/>
+          </a:fontRef>
+        </p:style>
+        <p:txBody>
+          <a:bodyPr rtlCol="0" anchor="ctr"/>
+          <a:lstStyle/>
+          <a:p>
+            <a:pPr algn="ctr"/>
+            <a:endParaRPr lang="ko-KR" altLang="en-US" dirty="0"/>
+          </a:p>
+        </p:txBody>
+      </p:sp>
+      <p:sp>
+        <p:nvSpPr>
+          <p:cNvPr id="22" name="직사각형 21">
+            <a:extLst>
+              <a:ext uri="{FF2B5EF4-FFF2-40B4-BE49-F238E27FC236}">
+                <a16:creationId xmlns:a16="http://schemas.microsoft.com/office/drawing/2014/main" id="{307E622D-1500-4C58-8A7F-9EF7AA26C9B7}"/>
+              </a:ext>
+            </a:extLst>
+          </p:cNvPr>
+          <p:cNvSpPr/>
+          <p:nvPr/>
+        </p:nvSpPr>
+        <p:spPr>
+          <a:xfrm>
+            <a:off x="6309273" y="2833497"/>
+            <a:ext cx="141982" cy="162025"/>
+          </a:xfrm>
+          <a:prstGeom prst="rect">
+            <a:avLst/>
+          </a:prstGeom>
+          <a:ln>
+            <a:noFill/>
+          </a:ln>
+        </p:spPr>
+        <p:style>
+          <a:lnRef idx="1">
+            <a:schemeClr val="accent2"/>
+          </a:lnRef>
+          <a:fillRef idx="2">
+            <a:schemeClr val="accent2"/>
+          </a:fillRef>
+          <a:effectRef idx="1">
+            <a:schemeClr val="accent2"/>
+          </a:effectRef>
+          <a:fontRef idx="minor">
+            <a:schemeClr val="dk1"/>
+          </a:fontRef>
+        </p:style>
+        <p:txBody>
+          <a:bodyPr rtlCol="0" anchor="ctr"/>
+          <a:lstStyle/>
+          <a:p>
+            <a:pPr algn="ctr"/>
+            <a:endParaRPr lang="ko-KR" altLang="en-US" dirty="0"/>
+          </a:p>
+        </p:txBody>
+      </p:sp>
+      <p:sp>
+        <p:nvSpPr>
+          <p:cNvPr id="23" name="직사각형 22">
+            <a:extLst>
+              <a:ext uri="{FF2B5EF4-FFF2-40B4-BE49-F238E27FC236}">
+                <a16:creationId xmlns:a16="http://schemas.microsoft.com/office/drawing/2014/main" id="{0862C397-A993-4D7D-8FB6-BCFAAD761FFB}"/>
+              </a:ext>
+            </a:extLst>
+          </p:cNvPr>
+          <p:cNvSpPr/>
+          <p:nvPr/>
+        </p:nvSpPr>
+        <p:spPr>
+          <a:xfrm>
+            <a:off x="6506711" y="2833497"/>
+            <a:ext cx="156181" cy="162025"/>
+          </a:xfrm>
+          <a:prstGeom prst="rect">
+            <a:avLst/>
+          </a:prstGeom>
+          <a:ln>
+            <a:noFill/>
+          </a:ln>
+        </p:spPr>
+        <p:style>
+          <a:lnRef idx="1">
+            <a:schemeClr val="accent2"/>
+          </a:lnRef>
+          <a:fillRef idx="2">
+            <a:schemeClr val="accent2"/>
+          </a:fillRef>
+          <a:effectRef idx="1">
+            <a:schemeClr val="accent2"/>
+          </a:effectRef>
+          <a:fontRef idx="minor">
+            <a:schemeClr val="dk1"/>
+          </a:fontRef>
+        </p:style>
+        <p:txBody>
+          <a:bodyPr rtlCol="0" anchor="ctr"/>
+          <a:lstStyle/>
+          <a:p>
+            <a:pPr algn="ctr"/>
+            <a:endParaRPr lang="ko-KR" altLang="en-US" dirty="0"/>
+          </a:p>
+        </p:txBody>
+      </p:sp>
+      <p:sp>
+        <p:nvSpPr>
+          <p:cNvPr id="24" name="직사각형 23">
+            <a:extLst>
+              <a:ext uri="{FF2B5EF4-FFF2-40B4-BE49-F238E27FC236}">
+                <a16:creationId xmlns:a16="http://schemas.microsoft.com/office/drawing/2014/main" id="{5E54C82F-6709-4BA6-AF2A-A298EDA982FC}"/>
+              </a:ext>
+            </a:extLst>
+          </p:cNvPr>
+          <p:cNvSpPr/>
+          <p:nvPr/>
+        </p:nvSpPr>
+        <p:spPr>
+          <a:xfrm>
+            <a:off x="6310845" y="3051886"/>
+            <a:ext cx="141982" cy="162025"/>
+          </a:xfrm>
+          <a:prstGeom prst="rect">
+            <a:avLst/>
+          </a:prstGeom>
+          <a:ln>
+            <a:noFill/>
+          </a:ln>
+        </p:spPr>
+        <p:style>
+          <a:lnRef idx="1">
+            <a:schemeClr val="accent2"/>
+          </a:lnRef>
+          <a:fillRef idx="2">
+            <a:schemeClr val="accent2"/>
+          </a:fillRef>
+          <a:effectRef idx="1">
+            <a:schemeClr val="accent2"/>
+          </a:effectRef>
+          <a:fontRef idx="minor">
+            <a:schemeClr val="dk1"/>
+          </a:fontRef>
+        </p:style>
+        <p:txBody>
+          <a:bodyPr rtlCol="0" anchor="ctr"/>
+          <a:lstStyle/>
+          <a:p>
+            <a:pPr algn="ctr"/>
+            <a:endParaRPr lang="ko-KR" altLang="en-US" dirty="0"/>
+          </a:p>
+        </p:txBody>
+      </p:sp>
+      <p:sp>
+        <p:nvSpPr>
+          <p:cNvPr id="25" name="직사각형 24">
+            <a:extLst>
+              <a:ext uri="{FF2B5EF4-FFF2-40B4-BE49-F238E27FC236}">
+                <a16:creationId xmlns:a16="http://schemas.microsoft.com/office/drawing/2014/main" id="{119EACAD-696F-4CF8-8A1C-A45FEB163512}"/>
+              </a:ext>
+            </a:extLst>
+          </p:cNvPr>
+          <p:cNvSpPr/>
+          <p:nvPr/>
+        </p:nvSpPr>
+        <p:spPr>
+          <a:xfrm>
+            <a:off x="6508283" y="3051886"/>
+            <a:ext cx="156181" cy="162025"/>
+          </a:xfrm>
+          <a:prstGeom prst="rect">
+            <a:avLst/>
+          </a:prstGeom>
+          <a:ln>
+            <a:noFill/>
+          </a:ln>
+        </p:spPr>
+        <p:style>
+          <a:lnRef idx="1">
+            <a:schemeClr val="accent2"/>
+          </a:lnRef>
+          <a:fillRef idx="2">
+            <a:schemeClr val="accent2"/>
+          </a:fillRef>
+          <a:effectRef idx="1">
+            <a:schemeClr val="accent2"/>
+          </a:effectRef>
+          <a:fontRef idx="minor">
+            <a:schemeClr val="dk1"/>
+          </a:fontRef>
+        </p:style>
+        <p:txBody>
+          <a:bodyPr rtlCol="0" anchor="ctr"/>
+          <a:lstStyle/>
+          <a:p>
+            <a:pPr algn="ctr"/>
+            <a:endParaRPr lang="ko-KR" altLang="en-US" dirty="0"/>
+          </a:p>
+        </p:txBody>
+      </p:sp>
+      <p:sp>
+        <p:nvSpPr>
+          <p:cNvPr id="26" name="직사각형 25">
+            <a:extLst>
+              <a:ext uri="{FF2B5EF4-FFF2-40B4-BE49-F238E27FC236}">
+                <a16:creationId xmlns:a16="http://schemas.microsoft.com/office/drawing/2014/main" id="{B75D24B1-CAE8-4B31-86CB-0A7DAAE017BF}"/>
+              </a:ext>
+            </a:extLst>
+          </p:cNvPr>
+          <p:cNvSpPr/>
+          <p:nvPr/>
+        </p:nvSpPr>
+        <p:spPr>
+          <a:xfrm>
+            <a:off x="6307710" y="3256132"/>
+            <a:ext cx="141982" cy="162025"/>
+          </a:xfrm>
+          <a:prstGeom prst="rect">
+            <a:avLst/>
+          </a:prstGeom>
+          <a:ln>
+            <a:noFill/>
+          </a:ln>
+        </p:spPr>
+        <p:style>
+          <a:lnRef idx="1">
+            <a:schemeClr val="accent2"/>
+          </a:lnRef>
+          <a:fillRef idx="2">
+            <a:schemeClr val="accent2"/>
+          </a:fillRef>
+          <a:effectRef idx="1">
+            <a:schemeClr val="accent2"/>
+          </a:effectRef>
+          <a:fontRef idx="minor">
+            <a:schemeClr val="dk1"/>
+          </a:fontRef>
+        </p:style>
+        <p:txBody>
+          <a:bodyPr rtlCol="0" anchor="ctr"/>
+          <a:lstStyle/>
+          <a:p>
+            <a:pPr algn="ctr"/>
+            <a:endParaRPr lang="ko-KR" altLang="en-US" dirty="0"/>
+          </a:p>
+        </p:txBody>
+      </p:sp>
+      <p:sp>
+        <p:nvSpPr>
+          <p:cNvPr id="27" name="직사각형 26">
+            <a:extLst>
+              <a:ext uri="{FF2B5EF4-FFF2-40B4-BE49-F238E27FC236}">
+                <a16:creationId xmlns:a16="http://schemas.microsoft.com/office/drawing/2014/main" id="{C3114ACB-E575-4280-B590-D7858825E09A}"/>
+              </a:ext>
+            </a:extLst>
+          </p:cNvPr>
+          <p:cNvSpPr/>
+          <p:nvPr/>
+        </p:nvSpPr>
+        <p:spPr>
+          <a:xfrm>
+            <a:off x="6505148" y="3256132"/>
+            <a:ext cx="156181" cy="162025"/>
+          </a:xfrm>
+          <a:prstGeom prst="rect">
+            <a:avLst/>
+          </a:prstGeom>
+          <a:ln>
+            <a:noFill/>
+          </a:ln>
+        </p:spPr>
+        <p:style>
+          <a:lnRef idx="1">
+            <a:schemeClr val="accent2"/>
+          </a:lnRef>
+          <a:fillRef idx="2">
+            <a:schemeClr val="accent2"/>
+          </a:fillRef>
+          <a:effectRef idx="1">
+            <a:schemeClr val="accent2"/>
+          </a:effectRef>
+          <a:fontRef idx="minor">
+            <a:schemeClr val="dk1"/>
+          </a:fontRef>
+        </p:style>
+        <p:txBody>
+          <a:bodyPr rtlCol="0" anchor="ctr"/>
+          <a:lstStyle/>
+          <a:p>
+            <a:pPr algn="ctr"/>
+            <a:endParaRPr lang="ko-KR" altLang="en-US" dirty="0"/>
+          </a:p>
+        </p:txBody>
+      </p:sp>
+      <p:sp>
+        <p:nvSpPr>
+          <p:cNvPr id="28" name="직사각형 27">
+            <a:extLst>
+              <a:ext uri="{FF2B5EF4-FFF2-40B4-BE49-F238E27FC236}">
+                <a16:creationId xmlns:a16="http://schemas.microsoft.com/office/drawing/2014/main" id="{C1C88079-3B8E-4446-8EFF-974948DED428}"/>
+              </a:ext>
+            </a:extLst>
+          </p:cNvPr>
+          <p:cNvSpPr/>
+          <p:nvPr/>
+        </p:nvSpPr>
+        <p:spPr>
+          <a:xfrm>
+            <a:off x="6309282" y="3446240"/>
+            <a:ext cx="141982" cy="162025"/>
+          </a:xfrm>
+          <a:prstGeom prst="rect">
+            <a:avLst/>
+          </a:prstGeom>
+          <a:ln>
+            <a:noFill/>
+          </a:ln>
+        </p:spPr>
+        <p:style>
+          <a:lnRef idx="1">
+            <a:schemeClr val="accent2"/>
+          </a:lnRef>
+          <a:fillRef idx="2">
+            <a:schemeClr val="accent2"/>
+          </a:fillRef>
+          <a:effectRef idx="1">
+            <a:schemeClr val="accent2"/>
+          </a:effectRef>
+          <a:fontRef idx="minor">
+            <a:schemeClr val="dk1"/>
+          </a:fontRef>
+        </p:style>
+        <p:txBody>
+          <a:bodyPr rtlCol="0" anchor="ctr"/>
+          <a:lstStyle/>
+          <a:p>
+            <a:pPr algn="ctr"/>
+            <a:endParaRPr lang="ko-KR" altLang="en-US" dirty="0"/>
+          </a:p>
+        </p:txBody>
+      </p:sp>
+      <p:sp>
+        <p:nvSpPr>
+          <p:cNvPr id="29" name="직사각형 28">
+            <a:extLst>
+              <a:ext uri="{FF2B5EF4-FFF2-40B4-BE49-F238E27FC236}">
+                <a16:creationId xmlns:a16="http://schemas.microsoft.com/office/drawing/2014/main" id="{6EF016A8-BD32-480D-AD83-B1959936E00C}"/>
+              </a:ext>
+            </a:extLst>
+          </p:cNvPr>
+          <p:cNvSpPr/>
+          <p:nvPr/>
+        </p:nvSpPr>
+        <p:spPr>
+          <a:xfrm>
+            <a:off x="6506720" y="3446240"/>
+            <a:ext cx="156181" cy="162025"/>
+          </a:xfrm>
+          <a:prstGeom prst="rect">
+            <a:avLst/>
+          </a:prstGeom>
+          <a:ln>
+            <a:noFill/>
+          </a:ln>
+        </p:spPr>
+        <p:style>
+          <a:lnRef idx="1">
+            <a:schemeClr val="accent2"/>
+          </a:lnRef>
+          <a:fillRef idx="2">
+            <a:schemeClr val="accent2"/>
+          </a:fillRef>
+          <a:effectRef idx="1">
+            <a:schemeClr val="accent2"/>
+          </a:effectRef>
+          <a:fontRef idx="minor">
+            <a:schemeClr val="dk1"/>
+          </a:fontRef>
+        </p:style>
+        <p:txBody>
+          <a:bodyPr rtlCol="0" anchor="ctr"/>
+          <a:lstStyle/>
+          <a:p>
+            <a:pPr algn="ctr"/>
+            <a:endParaRPr lang="ko-KR" altLang="en-US" dirty="0"/>
+          </a:p>
+        </p:txBody>
+      </p:sp>
+      <p:sp>
+        <p:nvSpPr>
+          <p:cNvPr id="30" name="직사각형 29">
+            <a:extLst>
+              <a:ext uri="{FF2B5EF4-FFF2-40B4-BE49-F238E27FC236}">
+                <a16:creationId xmlns:a16="http://schemas.microsoft.com/office/drawing/2014/main" id="{8D4BA6C9-68B8-426E-A158-0EF2D2D468C3}"/>
+              </a:ext>
+            </a:extLst>
+          </p:cNvPr>
+          <p:cNvSpPr/>
+          <p:nvPr/>
+        </p:nvSpPr>
+        <p:spPr>
+          <a:xfrm>
+            <a:off x="6309278" y="3644204"/>
+            <a:ext cx="141982" cy="162025"/>
+          </a:xfrm>
+          <a:prstGeom prst="rect">
+            <a:avLst/>
+          </a:prstGeom>
+          <a:ln>
+            <a:noFill/>
+          </a:ln>
+        </p:spPr>
+        <p:style>
+          <a:lnRef idx="1">
+            <a:schemeClr val="accent2"/>
+          </a:lnRef>
+          <a:fillRef idx="2">
+            <a:schemeClr val="accent2"/>
+          </a:fillRef>
+          <a:effectRef idx="1">
+            <a:schemeClr val="accent2"/>
+          </a:effectRef>
+          <a:fontRef idx="minor">
+            <a:schemeClr val="dk1"/>
+          </a:fontRef>
+        </p:style>
+        <p:txBody>
+          <a:bodyPr rtlCol="0" anchor="ctr"/>
+          <a:lstStyle/>
+          <a:p>
+            <a:pPr algn="ctr"/>
+            <a:endParaRPr lang="ko-KR" altLang="en-US" dirty="0"/>
+          </a:p>
+        </p:txBody>
+      </p:sp>
+      <p:sp>
+        <p:nvSpPr>
+          <p:cNvPr id="31" name="직사각형 30">
+            <a:extLst>
+              <a:ext uri="{FF2B5EF4-FFF2-40B4-BE49-F238E27FC236}">
+                <a16:creationId xmlns:a16="http://schemas.microsoft.com/office/drawing/2014/main" id="{C7FC4233-6521-467D-B2B5-D670FFA60BED}"/>
+              </a:ext>
+            </a:extLst>
+          </p:cNvPr>
+          <p:cNvSpPr/>
+          <p:nvPr/>
+        </p:nvSpPr>
+        <p:spPr>
+          <a:xfrm>
+            <a:off x="6506716" y="3644204"/>
+            <a:ext cx="156181" cy="162025"/>
+          </a:xfrm>
+          <a:prstGeom prst="rect">
+            <a:avLst/>
+          </a:prstGeom>
+          <a:ln>
+            <a:noFill/>
+          </a:ln>
+        </p:spPr>
+        <p:style>
+          <a:lnRef idx="1">
+            <a:schemeClr val="accent2"/>
+          </a:lnRef>
+          <a:fillRef idx="2">
+            <a:schemeClr val="accent2"/>
+          </a:fillRef>
+          <a:effectRef idx="1">
+            <a:schemeClr val="accent2"/>
+          </a:effectRef>
+          <a:fontRef idx="minor">
+            <a:schemeClr val="dk1"/>
+          </a:fontRef>
+        </p:style>
+        <p:txBody>
+          <a:bodyPr rtlCol="0" anchor="ctr"/>
+          <a:lstStyle/>
+          <a:p>
+            <a:pPr algn="ctr"/>
+            <a:endParaRPr lang="ko-KR" altLang="en-US" dirty="0"/>
+          </a:p>
+        </p:txBody>
+      </p:sp>
+      <p:sp>
+        <p:nvSpPr>
+          <p:cNvPr id="32" name="직사각형 31">
+            <a:extLst>
+              <a:ext uri="{FF2B5EF4-FFF2-40B4-BE49-F238E27FC236}">
+                <a16:creationId xmlns:a16="http://schemas.microsoft.com/office/drawing/2014/main" id="{EF711C08-0960-49E8-93E5-529B9C5507E4}"/>
+              </a:ext>
+            </a:extLst>
+          </p:cNvPr>
+          <p:cNvSpPr/>
+          <p:nvPr/>
+        </p:nvSpPr>
+        <p:spPr>
+          <a:xfrm>
+            <a:off x="6310850" y="3862593"/>
+            <a:ext cx="141982" cy="162025"/>
+          </a:xfrm>
+          <a:prstGeom prst="rect">
+            <a:avLst/>
+          </a:prstGeom>
+          <a:ln>
+            <a:noFill/>
+          </a:ln>
+        </p:spPr>
+        <p:style>
+          <a:lnRef idx="1">
+            <a:schemeClr val="accent2"/>
+          </a:lnRef>
+          <a:fillRef idx="2">
+            <a:schemeClr val="accent2"/>
+          </a:fillRef>
+          <a:effectRef idx="1">
+            <a:schemeClr val="accent2"/>
+          </a:effectRef>
+          <a:fontRef idx="minor">
+            <a:schemeClr val="dk1"/>
+          </a:fontRef>
+        </p:style>
+        <p:txBody>
+          <a:bodyPr rtlCol="0" anchor="ctr"/>
+          <a:lstStyle/>
+          <a:p>
+            <a:pPr algn="ctr"/>
+            <a:endParaRPr lang="ko-KR" altLang="en-US" dirty="0"/>
+          </a:p>
+        </p:txBody>
+      </p:sp>
+      <p:sp>
+        <p:nvSpPr>
+          <p:cNvPr id="33" name="직사각형 32">
+            <a:extLst>
+              <a:ext uri="{FF2B5EF4-FFF2-40B4-BE49-F238E27FC236}">
+                <a16:creationId xmlns:a16="http://schemas.microsoft.com/office/drawing/2014/main" id="{D23F6C3B-B350-4258-9B77-7C7D97BA9271}"/>
+              </a:ext>
+            </a:extLst>
+          </p:cNvPr>
+          <p:cNvSpPr/>
+          <p:nvPr/>
+        </p:nvSpPr>
+        <p:spPr>
+          <a:xfrm>
+            <a:off x="6508288" y="3862593"/>
+            <a:ext cx="156181" cy="162025"/>
+          </a:xfrm>
+          <a:prstGeom prst="rect">
+            <a:avLst/>
+          </a:prstGeom>
+          <a:ln>
+            <a:noFill/>
+          </a:ln>
+        </p:spPr>
+        <p:style>
+          <a:lnRef idx="1">
+            <a:schemeClr val="accent2"/>
+          </a:lnRef>
+          <a:fillRef idx="2">
+            <a:schemeClr val="accent2"/>
+          </a:fillRef>
+          <a:effectRef idx="1">
+            <a:schemeClr val="accent2"/>
+          </a:effectRef>
+          <a:fontRef idx="minor">
+            <a:schemeClr val="dk1"/>
+          </a:fontRef>
+        </p:style>
+        <p:txBody>
+          <a:bodyPr rtlCol="0" anchor="ctr"/>
+          <a:lstStyle/>
+          <a:p>
+            <a:pPr algn="ctr"/>
+            <a:endParaRPr lang="ko-KR" altLang="en-US" dirty="0"/>
+          </a:p>
+        </p:txBody>
+      </p:sp>
+      <p:sp>
+        <p:nvSpPr>
+          <p:cNvPr id="34" name="직사각형 33">
+            <a:extLst>
+              <a:ext uri="{FF2B5EF4-FFF2-40B4-BE49-F238E27FC236}">
+                <a16:creationId xmlns:a16="http://schemas.microsoft.com/office/drawing/2014/main" id="{25B50405-08B5-4C55-A368-6F527E38B200}"/>
+              </a:ext>
+            </a:extLst>
+          </p:cNvPr>
+          <p:cNvSpPr/>
+          <p:nvPr/>
+        </p:nvSpPr>
+        <p:spPr>
+          <a:xfrm>
+            <a:off x="6309278" y="4068403"/>
+            <a:ext cx="141982" cy="162025"/>
+          </a:xfrm>
+          <a:prstGeom prst="rect">
+            <a:avLst/>
+          </a:prstGeom>
+          <a:ln>
+            <a:noFill/>
+          </a:ln>
+        </p:spPr>
+        <p:style>
+          <a:lnRef idx="1">
+            <a:schemeClr val="accent2"/>
+          </a:lnRef>
+          <a:fillRef idx="2">
+            <a:schemeClr val="accent2"/>
+          </a:fillRef>
+          <a:effectRef idx="1">
+            <a:schemeClr val="accent2"/>
+          </a:effectRef>
+          <a:fontRef idx="minor">
+            <a:schemeClr val="dk1"/>
+          </a:fontRef>
+        </p:style>
+        <p:txBody>
+          <a:bodyPr rtlCol="0" anchor="ctr"/>
+          <a:lstStyle/>
+          <a:p>
+            <a:pPr algn="ctr"/>
+            <a:endParaRPr lang="ko-KR" altLang="en-US" dirty="0"/>
+          </a:p>
+        </p:txBody>
+      </p:sp>
+      <p:sp>
+        <p:nvSpPr>
+          <p:cNvPr id="35" name="직사각형 34">
+            <a:extLst>
+              <a:ext uri="{FF2B5EF4-FFF2-40B4-BE49-F238E27FC236}">
+                <a16:creationId xmlns:a16="http://schemas.microsoft.com/office/drawing/2014/main" id="{3DCD008E-A195-4094-A76D-32C22CC35906}"/>
+              </a:ext>
+            </a:extLst>
+          </p:cNvPr>
+          <p:cNvSpPr/>
+          <p:nvPr/>
+        </p:nvSpPr>
+        <p:spPr>
+          <a:xfrm>
+            <a:off x="6506716" y="4068403"/>
+            <a:ext cx="156181" cy="162025"/>
+          </a:xfrm>
+          <a:prstGeom prst="rect">
+            <a:avLst/>
+          </a:prstGeom>
+          <a:ln>
+            <a:noFill/>
+          </a:ln>
+        </p:spPr>
+        <p:style>
+          <a:lnRef idx="1">
+            <a:schemeClr val="accent2"/>
+          </a:lnRef>
+          <a:fillRef idx="2">
+            <a:schemeClr val="accent2"/>
+          </a:fillRef>
+          <a:effectRef idx="1">
+            <a:schemeClr val="accent2"/>
+          </a:effectRef>
+          <a:fontRef idx="minor">
+            <a:schemeClr val="dk1"/>
+          </a:fontRef>
+        </p:style>
+        <p:txBody>
+          <a:bodyPr rtlCol="0" anchor="ctr"/>
+          <a:lstStyle/>
+          <a:p>
+            <a:pPr algn="ctr"/>
+            <a:endParaRPr lang="ko-KR" altLang="en-US" dirty="0"/>
+          </a:p>
+        </p:txBody>
+      </p:sp>
+      <p:sp>
+        <p:nvSpPr>
+          <p:cNvPr id="36" name="직사각형 35">
+            <a:extLst>
+              <a:ext uri="{FF2B5EF4-FFF2-40B4-BE49-F238E27FC236}">
+                <a16:creationId xmlns:a16="http://schemas.microsoft.com/office/drawing/2014/main" id="{9E6A6F18-8FEB-4270-B283-DB6A4AE5D6A4}"/>
+              </a:ext>
+            </a:extLst>
+          </p:cNvPr>
+          <p:cNvSpPr/>
+          <p:nvPr/>
+        </p:nvSpPr>
+        <p:spPr>
+          <a:xfrm>
+            <a:off x="6310850" y="4286792"/>
+            <a:ext cx="141982" cy="162025"/>
+          </a:xfrm>
+          <a:prstGeom prst="rect">
+            <a:avLst/>
+          </a:prstGeom>
+          <a:ln>
+            <a:noFill/>
+          </a:ln>
+        </p:spPr>
+        <p:style>
+          <a:lnRef idx="1">
+            <a:schemeClr val="accent2"/>
+          </a:lnRef>
+          <a:fillRef idx="2">
+            <a:schemeClr val="accent2"/>
+          </a:fillRef>
+          <a:effectRef idx="1">
+            <a:schemeClr val="accent2"/>
+          </a:effectRef>
+          <a:fontRef idx="minor">
+            <a:schemeClr val="dk1"/>
+          </a:fontRef>
+        </p:style>
+        <p:txBody>
+          <a:bodyPr rtlCol="0" anchor="ctr"/>
+          <a:lstStyle/>
+          <a:p>
+            <a:pPr algn="ctr"/>
+            <a:endParaRPr lang="ko-KR" altLang="en-US" dirty="0"/>
+          </a:p>
+        </p:txBody>
+      </p:sp>
+      <p:sp>
+        <p:nvSpPr>
+          <p:cNvPr id="37" name="직사각형 36">
+            <a:extLst>
+              <a:ext uri="{FF2B5EF4-FFF2-40B4-BE49-F238E27FC236}">
+                <a16:creationId xmlns:a16="http://schemas.microsoft.com/office/drawing/2014/main" id="{F7DB6DE1-3F21-47C1-B552-87166A19F926}"/>
+              </a:ext>
+            </a:extLst>
+          </p:cNvPr>
+          <p:cNvSpPr/>
+          <p:nvPr/>
+        </p:nvSpPr>
+        <p:spPr>
+          <a:xfrm>
+            <a:off x="6508288" y="4286792"/>
+            <a:ext cx="156181" cy="162025"/>
+          </a:xfrm>
+          <a:prstGeom prst="rect">
+            <a:avLst/>
+          </a:prstGeom>
+          <a:ln>
+            <a:noFill/>
+          </a:ln>
+        </p:spPr>
+        <p:style>
+          <a:lnRef idx="1">
+            <a:schemeClr val="accent2"/>
+          </a:lnRef>
+          <a:fillRef idx="2">
+            <a:schemeClr val="accent2"/>
+          </a:fillRef>
+          <a:effectRef idx="1">
+            <a:schemeClr val="accent2"/>
+          </a:effectRef>
+          <a:fontRef idx="minor">
+            <a:schemeClr val="dk1"/>
+          </a:fontRef>
+        </p:style>
+        <p:txBody>
+          <a:bodyPr rtlCol="0" anchor="ctr"/>
+          <a:lstStyle/>
+          <a:p>
+            <a:pPr algn="ctr"/>
+            <a:endParaRPr lang="ko-KR" altLang="en-US" dirty="0"/>
+          </a:p>
+        </p:txBody>
+      </p:sp>
+      <p:sp>
+        <p:nvSpPr>
+          <p:cNvPr id="38" name="직사각형 37">
+            <a:extLst>
+              <a:ext uri="{FF2B5EF4-FFF2-40B4-BE49-F238E27FC236}">
+                <a16:creationId xmlns:a16="http://schemas.microsoft.com/office/drawing/2014/main" id="{AC281E1C-5638-4934-AF03-20A089E9B167}"/>
+              </a:ext>
+            </a:extLst>
+          </p:cNvPr>
+          <p:cNvSpPr/>
+          <p:nvPr/>
+        </p:nvSpPr>
+        <p:spPr>
+          <a:xfrm>
+            <a:off x="6310846" y="4484756"/>
+            <a:ext cx="141982" cy="162025"/>
+          </a:xfrm>
+          <a:prstGeom prst="rect">
+            <a:avLst/>
+          </a:prstGeom>
+          <a:ln>
+            <a:noFill/>
+          </a:ln>
+        </p:spPr>
+        <p:style>
+          <a:lnRef idx="1">
+            <a:schemeClr val="accent2"/>
+          </a:lnRef>
+          <a:fillRef idx="2">
+            <a:schemeClr val="accent2"/>
+          </a:fillRef>
+          <a:effectRef idx="1">
+            <a:schemeClr val="accent2"/>
+          </a:effectRef>
+          <a:fontRef idx="minor">
+            <a:schemeClr val="dk1"/>
+          </a:fontRef>
+        </p:style>
+        <p:txBody>
+          <a:bodyPr rtlCol="0" anchor="ctr"/>
+          <a:lstStyle/>
+          <a:p>
+            <a:pPr algn="ctr"/>
+            <a:endParaRPr lang="ko-KR" altLang="en-US" dirty="0"/>
+          </a:p>
+        </p:txBody>
+      </p:sp>
+      <p:sp>
+        <p:nvSpPr>
+          <p:cNvPr id="39" name="직사각형 38">
+            <a:extLst>
+              <a:ext uri="{FF2B5EF4-FFF2-40B4-BE49-F238E27FC236}">
+                <a16:creationId xmlns:a16="http://schemas.microsoft.com/office/drawing/2014/main" id="{A9F4DB62-0FA6-4E9B-88F7-CC6BF4F99070}"/>
+              </a:ext>
+            </a:extLst>
+          </p:cNvPr>
+          <p:cNvSpPr/>
+          <p:nvPr/>
+        </p:nvSpPr>
+        <p:spPr>
+          <a:xfrm>
+            <a:off x="6508284" y="4484756"/>
+            <a:ext cx="156181" cy="162025"/>
+          </a:xfrm>
+          <a:prstGeom prst="rect">
+            <a:avLst/>
+          </a:prstGeom>
+          <a:ln>
+            <a:noFill/>
+          </a:ln>
+        </p:spPr>
+        <p:style>
+          <a:lnRef idx="1">
+            <a:schemeClr val="accent2"/>
+          </a:lnRef>
+          <a:fillRef idx="2">
+            <a:schemeClr val="accent2"/>
+          </a:fillRef>
+          <a:effectRef idx="1">
+            <a:schemeClr val="accent2"/>
+          </a:effectRef>
+          <a:fontRef idx="minor">
+            <a:schemeClr val="dk1"/>
+          </a:fontRef>
+        </p:style>
+        <p:txBody>
+          <a:bodyPr rtlCol="0" anchor="ctr"/>
+          <a:lstStyle/>
+          <a:p>
+            <a:pPr algn="ctr"/>
+            <a:endParaRPr lang="ko-KR" altLang="en-US" dirty="0"/>
+          </a:p>
+        </p:txBody>
+      </p:sp>
+      <p:sp>
+        <p:nvSpPr>
+          <p:cNvPr id="40" name="직사각형 39">
+            <a:extLst>
+              <a:ext uri="{FF2B5EF4-FFF2-40B4-BE49-F238E27FC236}">
+                <a16:creationId xmlns:a16="http://schemas.microsoft.com/office/drawing/2014/main" id="{69FDE5FE-DFD2-4178-B61E-8041A6A01BCA}"/>
+              </a:ext>
+            </a:extLst>
+          </p:cNvPr>
+          <p:cNvSpPr/>
+          <p:nvPr/>
+        </p:nvSpPr>
+        <p:spPr>
+          <a:xfrm>
+            <a:off x="6312418" y="4674864"/>
+            <a:ext cx="141982" cy="162025"/>
+          </a:xfrm>
+          <a:prstGeom prst="rect">
+            <a:avLst/>
+          </a:prstGeom>
+          <a:ln>
+            <a:noFill/>
+          </a:ln>
+        </p:spPr>
+        <p:style>
+          <a:lnRef idx="1">
+            <a:schemeClr val="accent2"/>
+          </a:lnRef>
+          <a:fillRef idx="2">
+            <a:schemeClr val="accent2"/>
+          </a:fillRef>
+          <a:effectRef idx="1">
+            <a:schemeClr val="accent2"/>
+          </a:effectRef>
+          <a:fontRef idx="minor">
+            <a:schemeClr val="dk1"/>
+          </a:fontRef>
+        </p:style>
+        <p:txBody>
+          <a:bodyPr rtlCol="0" anchor="ctr"/>
+          <a:lstStyle/>
+          <a:p>
+            <a:pPr algn="ctr"/>
+            <a:endParaRPr lang="ko-KR" altLang="en-US" dirty="0"/>
+          </a:p>
+        </p:txBody>
+      </p:sp>
+      <p:sp>
+        <p:nvSpPr>
+          <p:cNvPr id="41" name="직사각형 40">
+            <a:extLst>
+              <a:ext uri="{FF2B5EF4-FFF2-40B4-BE49-F238E27FC236}">
+                <a16:creationId xmlns:a16="http://schemas.microsoft.com/office/drawing/2014/main" id="{3E448843-39E3-44B8-A923-7A76430139E5}"/>
+              </a:ext>
+            </a:extLst>
+          </p:cNvPr>
+          <p:cNvSpPr/>
+          <p:nvPr/>
+        </p:nvSpPr>
+        <p:spPr>
+          <a:xfrm>
+            <a:off x="6509856" y="4674864"/>
+            <a:ext cx="156181" cy="162025"/>
+          </a:xfrm>
+          <a:prstGeom prst="rect">
+            <a:avLst/>
+          </a:prstGeom>
+          <a:ln>
+            <a:noFill/>
+          </a:ln>
+        </p:spPr>
+        <p:style>
+          <a:lnRef idx="1">
+            <a:schemeClr val="accent2"/>
+          </a:lnRef>
+          <a:fillRef idx="2">
+            <a:schemeClr val="accent2"/>
+          </a:fillRef>
+          <a:effectRef idx="1">
+            <a:schemeClr val="accent2"/>
+          </a:effectRef>
+          <a:fontRef idx="minor">
+            <a:schemeClr val="dk1"/>
+          </a:fontRef>
+        </p:style>
+        <p:txBody>
+          <a:bodyPr rtlCol="0" anchor="ctr"/>
+          <a:lstStyle/>
+          <a:p>
+            <a:pPr algn="ctr"/>
+            <a:endParaRPr lang="ko-KR" altLang="en-US" dirty="0"/>
+          </a:p>
+        </p:txBody>
+      </p:sp>
+      <p:pic>
+        <p:nvPicPr>
+          <p:cNvPr id="8" name="그림 7">
+            <a:extLst>
+              <a:ext uri="{FF2B5EF4-FFF2-40B4-BE49-F238E27FC236}">
+                <a16:creationId xmlns:a16="http://schemas.microsoft.com/office/drawing/2014/main" id="{E1B5D984-020B-4844-89B9-2DA86EA01435}"/>
+              </a:ext>
+            </a:extLst>
+          </p:cNvPr>
+          <p:cNvPicPr>
+            <a:picLocks noChangeAspect="1"/>
+          </p:cNvPicPr>
+          <p:nvPr/>
+        </p:nvPicPr>
+        <p:blipFill rotWithShape="1">
+          <a:blip r:embed="rId4"/>
+          <a:srcRect l="61856" t="9912" r="22139" b="12307"/>
+          <a:stretch/>
+        </p:blipFill>
+        <p:spPr>
+          <a:xfrm>
+            <a:off x="203822" y="993106"/>
+            <a:ext cx="3883844" cy="5337922"/>
+          </a:xfrm>
+          <a:prstGeom prst="rect">
+            <a:avLst/>
+          </a:prstGeom>
+        </p:spPr>
+      </p:pic>
+    </p:spTree>
+    <p:extLst>
+      <p:ext uri="{BB962C8B-B14F-4D97-AF65-F5344CB8AC3E}">
+        <p14:creationId xmlns:p14="http://schemas.microsoft.com/office/powerpoint/2010/main" val="4052356145"/>
       </p:ext>
     </p:extLst>
   </p:cSld>

</xml_diff>